<commit_message>
final version of AI Project
</commit_message>
<xml_diff>
--- a/Shared/Presentation1.pptx
+++ b/Shared/Presentation1.pptx
@@ -277,7 +277,7 @@
           <a:p>
             <a:fld id="{D4A8E8D4-1BBF-4AEB-A9F4-BB790585A0F5}" type="datetimeFigureOut">
               <a:rPr lang="ar-SA" smtClean="0"/>
-              <a:t>24/04/43</a:t>
+              <a:t>29/04/43</a:t>
             </a:fld>
             <a:endParaRPr lang="ar-SA"/>
           </a:p>
@@ -477,7 +477,7 @@
           <a:p>
             <a:fld id="{D4A8E8D4-1BBF-4AEB-A9F4-BB790585A0F5}" type="datetimeFigureOut">
               <a:rPr lang="ar-SA" smtClean="0"/>
-              <a:t>24/04/43</a:t>
+              <a:t>29/04/43</a:t>
             </a:fld>
             <a:endParaRPr lang="ar-SA"/>
           </a:p>
@@ -687,7 +687,7 @@
           <a:p>
             <a:fld id="{D4A8E8D4-1BBF-4AEB-A9F4-BB790585A0F5}" type="datetimeFigureOut">
               <a:rPr lang="ar-SA" smtClean="0"/>
-              <a:t>24/04/43</a:t>
+              <a:t>29/04/43</a:t>
             </a:fld>
             <a:endParaRPr lang="ar-SA"/>
           </a:p>
@@ -887,7 +887,7 @@
           <a:p>
             <a:fld id="{D4A8E8D4-1BBF-4AEB-A9F4-BB790585A0F5}" type="datetimeFigureOut">
               <a:rPr lang="ar-SA" smtClean="0"/>
-              <a:t>24/04/43</a:t>
+              <a:t>29/04/43</a:t>
             </a:fld>
             <a:endParaRPr lang="ar-SA"/>
           </a:p>
@@ -1163,7 +1163,7 @@
           <a:p>
             <a:fld id="{D4A8E8D4-1BBF-4AEB-A9F4-BB790585A0F5}" type="datetimeFigureOut">
               <a:rPr lang="ar-SA" smtClean="0"/>
-              <a:t>24/04/43</a:t>
+              <a:t>29/04/43</a:t>
             </a:fld>
             <a:endParaRPr lang="ar-SA"/>
           </a:p>
@@ -1431,7 +1431,7 @@
           <a:p>
             <a:fld id="{D4A8E8D4-1BBF-4AEB-A9F4-BB790585A0F5}" type="datetimeFigureOut">
               <a:rPr lang="ar-SA" smtClean="0"/>
-              <a:t>24/04/43</a:t>
+              <a:t>29/04/43</a:t>
             </a:fld>
             <a:endParaRPr lang="ar-SA"/>
           </a:p>
@@ -1846,7 +1846,7 @@
           <a:p>
             <a:fld id="{D4A8E8D4-1BBF-4AEB-A9F4-BB790585A0F5}" type="datetimeFigureOut">
               <a:rPr lang="ar-SA" smtClean="0"/>
-              <a:t>24/04/43</a:t>
+              <a:t>29/04/43</a:t>
             </a:fld>
             <a:endParaRPr lang="ar-SA"/>
           </a:p>
@@ -1988,7 +1988,7 @@
           <a:p>
             <a:fld id="{D4A8E8D4-1BBF-4AEB-A9F4-BB790585A0F5}" type="datetimeFigureOut">
               <a:rPr lang="ar-SA" smtClean="0"/>
-              <a:t>24/04/43</a:t>
+              <a:t>29/04/43</a:t>
             </a:fld>
             <a:endParaRPr lang="ar-SA"/>
           </a:p>
@@ -2101,7 +2101,7 @@
           <a:p>
             <a:fld id="{D4A8E8D4-1BBF-4AEB-A9F4-BB790585A0F5}" type="datetimeFigureOut">
               <a:rPr lang="ar-SA" smtClean="0"/>
-              <a:t>24/04/43</a:t>
+              <a:t>29/04/43</a:t>
             </a:fld>
             <a:endParaRPr lang="ar-SA"/>
           </a:p>
@@ -2414,7 +2414,7 @@
           <a:p>
             <a:fld id="{D4A8E8D4-1BBF-4AEB-A9F4-BB790585A0F5}" type="datetimeFigureOut">
               <a:rPr lang="ar-SA" smtClean="0"/>
-              <a:t>24/04/43</a:t>
+              <a:t>29/04/43</a:t>
             </a:fld>
             <a:endParaRPr lang="ar-SA"/>
           </a:p>
@@ -2703,7 +2703,7 @@
           <a:p>
             <a:fld id="{D4A8E8D4-1BBF-4AEB-A9F4-BB790585A0F5}" type="datetimeFigureOut">
               <a:rPr lang="ar-SA" smtClean="0"/>
-              <a:t>24/04/43</a:t>
+              <a:t>29/04/43</a:t>
             </a:fld>
             <a:endParaRPr lang="ar-SA"/>
           </a:p>
@@ -2946,7 +2946,7 @@
           <a:p>
             <a:fld id="{D4A8E8D4-1BBF-4AEB-A9F4-BB790585A0F5}" type="datetimeFigureOut">
               <a:rPr lang="ar-SA" smtClean="0"/>
-              <a:t>24/04/43</a:t>
+              <a:t>29/04/43</a:t>
             </a:fld>
             <a:endParaRPr lang="ar-SA"/>
           </a:p>
@@ -3771,28 +3771,36 @@
           <p:cNvCxnSpPr>
             <a:cxnSpLocks/>
             <a:stCxn id="16" idx="3"/>
-            <a:endCxn id="33" idx="1"/>
           </p:cNvCxnSpPr>
           <p:nvPr/>
         </p:nvCxnSpPr>
         <p:spPr>
           <a:xfrm>
             <a:off x="1086173" y="1784354"/>
-            <a:ext cx="1212743" cy="1286927"/>
+            <a:ext cx="1212743" cy="1140342"/>
           </a:xfrm>
           <a:prstGeom prst="line">
             <a:avLst/>
           </a:prstGeom>
-        </p:spPr>
-        <p:style>
-          <a:lnRef idx="3">
-            <a:schemeClr val="dk1"/>
+          <a:ln w="9525" cap="flat" cmpd="sng" algn="ctr">
+            <a:solidFill>
+              <a:schemeClr val="dk1"/>
+            </a:solidFill>
+            <a:prstDash val="solid"/>
+            <a:round/>
+            <a:headEnd type="none" w="med" len="med"/>
+            <a:tailEnd type="arrow" w="med" len="med"/>
+          </a:ln>
+        </p:spPr>
+        <p:style>
+          <a:lnRef idx="0">
+            <a:scrgbClr r="0" g="0" b="0"/>
           </a:lnRef>
           <a:fillRef idx="0">
-            <a:schemeClr val="dk1"/>
-          </a:fillRef>
-          <a:effectRef idx="2">
-            <a:schemeClr val="dk1"/>
+            <a:scrgbClr r="0" g="0" b="0"/>
+          </a:fillRef>
+          <a:effectRef idx="0">
+            <a:scrgbClr r="0" g="0" b="0"/>
           </a:effectRef>
           <a:fontRef idx="minor">
             <a:schemeClr val="tx1"/>
@@ -3823,16 +3831,25 @@
           <a:prstGeom prst="line">
             <a:avLst/>
           </a:prstGeom>
-        </p:spPr>
-        <p:style>
-          <a:lnRef idx="3">
-            <a:schemeClr val="dk1"/>
+          <a:ln w="9525" cap="flat" cmpd="sng" algn="ctr">
+            <a:solidFill>
+              <a:schemeClr val="dk1"/>
+            </a:solidFill>
+            <a:prstDash val="solid"/>
+            <a:round/>
+            <a:headEnd type="none" w="med" len="med"/>
+            <a:tailEnd type="arrow" w="med" len="med"/>
+          </a:ln>
+        </p:spPr>
+        <p:style>
+          <a:lnRef idx="0">
+            <a:scrgbClr r="0" g="0" b="0"/>
           </a:lnRef>
           <a:fillRef idx="0">
-            <a:schemeClr val="dk1"/>
-          </a:fillRef>
-          <a:effectRef idx="2">
-            <a:schemeClr val="dk1"/>
+            <a:scrgbClr r="0" g="0" b="0"/>
+          </a:fillRef>
+          <a:effectRef idx="0">
+            <a:scrgbClr r="0" g="0" b="0"/>
           </a:effectRef>
           <a:fontRef idx="minor">
             <a:schemeClr val="tx1"/>
@@ -3851,28 +3868,36 @@
           <p:cNvCxnSpPr>
             <a:cxnSpLocks/>
             <a:stCxn id="46" idx="3"/>
-            <a:endCxn id="33" idx="1"/>
           </p:cNvCxnSpPr>
           <p:nvPr/>
         </p:nvCxnSpPr>
         <p:spPr>
           <a:xfrm flipV="1">
-            <a:off x="1088615" y="3071281"/>
-            <a:ext cx="1210301" cy="1097891"/>
+            <a:off x="1088615" y="3182415"/>
+            <a:ext cx="1210301" cy="986757"/>
           </a:xfrm>
           <a:prstGeom prst="line">
             <a:avLst/>
           </a:prstGeom>
-        </p:spPr>
-        <p:style>
-          <a:lnRef idx="3">
-            <a:schemeClr val="dk1"/>
+          <a:ln w="9525" cap="flat" cmpd="sng" algn="ctr">
+            <a:solidFill>
+              <a:schemeClr val="dk1"/>
+            </a:solidFill>
+            <a:prstDash val="solid"/>
+            <a:round/>
+            <a:headEnd type="none" w="med" len="med"/>
+            <a:tailEnd type="arrow" w="med" len="med"/>
+          </a:ln>
+        </p:spPr>
+        <p:style>
+          <a:lnRef idx="0">
+            <a:scrgbClr r="0" g="0" b="0"/>
           </a:lnRef>
           <a:fillRef idx="0">
-            <a:schemeClr val="dk1"/>
-          </a:fillRef>
-          <a:effectRef idx="2">
-            <a:schemeClr val="dk1"/>
+            <a:scrgbClr r="0" g="0" b="0"/>
+          </a:fillRef>
+          <a:effectRef idx="0">
+            <a:scrgbClr r="0" g="0" b="0"/>
           </a:effectRef>
           <a:fontRef idx="minor">
             <a:schemeClr val="tx1"/>
@@ -3891,28 +3916,36 @@
           <p:cNvCxnSpPr>
             <a:cxnSpLocks/>
             <a:stCxn id="44" idx="3"/>
-            <a:endCxn id="33" idx="1"/>
           </p:cNvCxnSpPr>
           <p:nvPr/>
         </p:nvCxnSpPr>
         <p:spPr>
           <a:xfrm flipV="1">
-            <a:off x="1083519" y="3071281"/>
-            <a:ext cx="1215397" cy="2372405"/>
+            <a:off x="1083519" y="3229083"/>
+            <a:ext cx="1285031" cy="2214603"/>
           </a:xfrm>
           <a:prstGeom prst="line">
             <a:avLst/>
           </a:prstGeom>
-        </p:spPr>
-        <p:style>
-          <a:lnRef idx="3">
-            <a:schemeClr val="dk1"/>
+          <a:ln w="9525" cap="flat" cmpd="sng" algn="ctr">
+            <a:solidFill>
+              <a:schemeClr val="dk1"/>
+            </a:solidFill>
+            <a:prstDash val="solid"/>
+            <a:round/>
+            <a:headEnd type="none" w="med" len="med"/>
+            <a:tailEnd type="arrow" w="med" len="med"/>
+          </a:ln>
+        </p:spPr>
+        <p:style>
+          <a:lnRef idx="0">
+            <a:scrgbClr r="0" g="0" b="0"/>
           </a:lnRef>
           <a:fillRef idx="0">
-            <a:schemeClr val="dk1"/>
-          </a:fillRef>
-          <a:effectRef idx="2">
-            <a:schemeClr val="dk1"/>
+            <a:scrgbClr r="0" g="0" b="0"/>
+          </a:fillRef>
+          <a:effectRef idx="0">
+            <a:scrgbClr r="0" g="0" b="0"/>
           </a:effectRef>
           <a:fontRef idx="minor">
             <a:schemeClr val="tx1"/>
@@ -4381,29 +4414,38 @@
             </a:extLst>
           </p:cNvPr>
           <p:cNvCxnSpPr>
-            <a:stCxn id="91" idx="1"/>
-            <a:endCxn id="94" idx="3"/>
+            <a:cxnSpLocks/>
+            <a:stCxn id="94" idx="3"/>
           </p:cNvCxnSpPr>
           <p:nvPr/>
         </p:nvCxnSpPr>
         <p:spPr>
-          <a:xfrm flipH="1">
-            <a:off x="10003499" y="1784354"/>
-            <a:ext cx="1072471" cy="1486844"/>
+          <a:xfrm flipV="1">
+            <a:off x="10003499" y="1905862"/>
+            <a:ext cx="1004781" cy="1365336"/>
           </a:xfrm>
           <a:prstGeom prst="line">
             <a:avLst/>
           </a:prstGeom>
-        </p:spPr>
-        <p:style>
-          <a:lnRef idx="3">
-            <a:schemeClr val="dk1"/>
+          <a:ln w="9525" cap="flat" cmpd="sng" algn="ctr">
+            <a:solidFill>
+              <a:schemeClr val="dk1"/>
+            </a:solidFill>
+            <a:prstDash val="solid"/>
+            <a:round/>
+            <a:headEnd type="none" w="med" len="med"/>
+            <a:tailEnd type="arrow" w="med" len="med"/>
+          </a:ln>
+        </p:spPr>
+        <p:style>
+          <a:lnRef idx="0">
+            <a:scrgbClr r="0" g="0" b="0"/>
           </a:lnRef>
           <a:fillRef idx="0">
-            <a:schemeClr val="dk1"/>
-          </a:fillRef>
-          <a:effectRef idx="2">
-            <a:schemeClr val="dk1"/>
+            <a:scrgbClr r="0" g="0" b="0"/>
+          </a:fillRef>
+          <a:effectRef idx="0">
+            <a:scrgbClr r="0" g="0" b="0"/>
           </a:effectRef>
           <a:fontRef idx="minor">
             <a:schemeClr val="tx1"/>
@@ -4420,29 +4462,38 @@
             </a:extLst>
           </p:cNvPr>
           <p:cNvCxnSpPr>
-            <a:stCxn id="90" idx="1"/>
-            <a:endCxn id="94" idx="3"/>
+            <a:cxnSpLocks/>
+            <a:stCxn id="94" idx="3"/>
           </p:cNvCxnSpPr>
           <p:nvPr/>
         </p:nvCxnSpPr>
         <p:spPr>
-          <a:xfrm flipH="1">
-            <a:off x="10003499" y="2981961"/>
-            <a:ext cx="1072471" cy="289237"/>
+          <a:xfrm flipV="1">
+            <a:off x="10003499" y="3011101"/>
+            <a:ext cx="1004781" cy="260097"/>
           </a:xfrm>
           <a:prstGeom prst="line">
             <a:avLst/>
           </a:prstGeom>
-        </p:spPr>
-        <p:style>
-          <a:lnRef idx="3">
-            <a:schemeClr val="dk1"/>
+          <a:ln w="9525" cap="flat" cmpd="sng" algn="ctr">
+            <a:solidFill>
+              <a:schemeClr val="dk1"/>
+            </a:solidFill>
+            <a:prstDash val="solid"/>
+            <a:round/>
+            <a:headEnd type="none" w="med" len="med"/>
+            <a:tailEnd type="arrow" w="med" len="med"/>
+          </a:ln>
+        </p:spPr>
+        <p:style>
+          <a:lnRef idx="0">
+            <a:scrgbClr r="0" g="0" b="0"/>
           </a:lnRef>
           <a:fillRef idx="0">
-            <a:schemeClr val="dk1"/>
-          </a:fillRef>
-          <a:effectRef idx="2">
-            <a:schemeClr val="dk1"/>
+            <a:scrgbClr r="0" g="0" b="0"/>
+          </a:fillRef>
+          <a:effectRef idx="0">
+            <a:scrgbClr r="0" g="0" b="0"/>
           </a:effectRef>
           <a:fontRef idx="minor">
             <a:schemeClr val="tx1"/>
@@ -4459,29 +4510,38 @@
             </a:extLst>
           </p:cNvPr>
           <p:cNvCxnSpPr>
-            <a:stCxn id="81" idx="1"/>
-            <a:endCxn id="94" idx="3"/>
+            <a:cxnSpLocks/>
+            <a:stCxn id="94" idx="3"/>
           </p:cNvCxnSpPr>
           <p:nvPr/>
         </p:nvCxnSpPr>
         <p:spPr>
-          <a:xfrm flipH="1" flipV="1">
+          <a:xfrm>
             <a:off x="10003499" y="3271198"/>
-            <a:ext cx="1072471" cy="897972"/>
+            <a:ext cx="1004781" cy="875063"/>
           </a:xfrm>
           <a:prstGeom prst="line">
             <a:avLst/>
           </a:prstGeom>
-        </p:spPr>
-        <p:style>
-          <a:lnRef idx="3">
-            <a:schemeClr val="dk1"/>
+          <a:ln w="9525" cap="flat" cmpd="sng" algn="ctr">
+            <a:solidFill>
+              <a:schemeClr val="dk1"/>
+            </a:solidFill>
+            <a:prstDash val="solid"/>
+            <a:round/>
+            <a:headEnd type="none" w="med" len="med"/>
+            <a:tailEnd type="arrow" w="med" len="med"/>
+          </a:ln>
+        </p:spPr>
+        <p:style>
+          <a:lnRef idx="0">
+            <a:scrgbClr r="0" g="0" b="0"/>
           </a:lnRef>
           <a:fillRef idx="0">
-            <a:schemeClr val="dk1"/>
-          </a:fillRef>
-          <a:effectRef idx="2">
-            <a:schemeClr val="dk1"/>
+            <a:scrgbClr r="0" g="0" b="0"/>
+          </a:fillRef>
+          <a:effectRef idx="0">
+            <a:scrgbClr r="0" g="0" b="0"/>
           </a:effectRef>
           <a:fontRef idx="minor">
             <a:schemeClr val="tx1"/>
@@ -4498,29 +4558,38 @@
             </a:extLst>
           </p:cNvPr>
           <p:cNvCxnSpPr>
-            <a:stCxn id="80" idx="1"/>
-            <a:endCxn id="94" idx="3"/>
+            <a:cxnSpLocks/>
+            <a:stCxn id="94" idx="3"/>
           </p:cNvCxnSpPr>
           <p:nvPr/>
         </p:nvCxnSpPr>
         <p:spPr>
-          <a:xfrm flipH="1" flipV="1">
+          <a:xfrm>
             <a:off x="10003499" y="3271198"/>
-            <a:ext cx="1074505" cy="2172488"/>
+            <a:ext cx="1001185" cy="2012882"/>
           </a:xfrm>
           <a:prstGeom prst="line">
             <a:avLst/>
           </a:prstGeom>
-        </p:spPr>
-        <p:style>
-          <a:lnRef idx="3">
-            <a:schemeClr val="dk1"/>
+          <a:ln w="9525" cap="flat" cmpd="sng" algn="ctr">
+            <a:solidFill>
+              <a:schemeClr val="dk1"/>
+            </a:solidFill>
+            <a:prstDash val="solid"/>
+            <a:round/>
+            <a:headEnd type="none" w="med" len="med"/>
+            <a:tailEnd type="arrow" w="med" len="med"/>
+          </a:ln>
+        </p:spPr>
+        <p:style>
+          <a:lnRef idx="0">
+            <a:scrgbClr r="0" g="0" b="0"/>
           </a:lnRef>
           <a:fillRef idx="0">
-            <a:schemeClr val="dk1"/>
-          </a:fillRef>
-          <a:effectRef idx="2">
-            <a:schemeClr val="dk1"/>
+            <a:scrgbClr r="0" g="0" b="0"/>
+          </a:fillRef>
+          <a:effectRef idx="0">
+            <a:scrgbClr r="0" g="0" b="0"/>
           </a:effectRef>
           <a:fontRef idx="minor">
             <a:schemeClr val="tx1"/>
@@ -4550,16 +4619,25 @@
           <a:prstGeom prst="line">
             <a:avLst/>
           </a:prstGeom>
-        </p:spPr>
-        <p:style>
-          <a:lnRef idx="3">
-            <a:schemeClr val="dk1"/>
+          <a:ln w="9525" cap="flat" cmpd="sng" algn="ctr">
+            <a:solidFill>
+              <a:schemeClr val="dk1"/>
+            </a:solidFill>
+            <a:prstDash val="solid"/>
+            <a:round/>
+            <a:headEnd type="none" w="med" len="med"/>
+            <a:tailEnd type="arrow" w="med" len="med"/>
+          </a:ln>
+        </p:spPr>
+        <p:style>
+          <a:lnRef idx="0">
+            <a:scrgbClr r="0" g="0" b="0"/>
           </a:lnRef>
           <a:fillRef idx="0">
-            <a:schemeClr val="dk1"/>
-          </a:fillRef>
-          <a:effectRef idx="2">
-            <a:schemeClr val="dk1"/>
+            <a:scrgbClr r="0" g="0" b="0"/>
+          </a:fillRef>
+          <a:effectRef idx="0">
+            <a:scrgbClr r="0" g="0" b="0"/>
           </a:effectRef>
           <a:fontRef idx="minor">
             <a:schemeClr val="tx1"/>
@@ -4590,16 +4668,25 @@
           <a:prstGeom prst="line">
             <a:avLst/>
           </a:prstGeom>
-        </p:spPr>
-        <p:style>
-          <a:lnRef idx="3">
-            <a:schemeClr val="dk1"/>
+          <a:ln w="9525" cap="flat" cmpd="sng" algn="ctr">
+            <a:solidFill>
+              <a:schemeClr val="dk1"/>
+            </a:solidFill>
+            <a:prstDash val="solid"/>
+            <a:round/>
+            <a:headEnd type="arrow" w="med" len="med"/>
+            <a:tailEnd type="arrow" w="med" len="med"/>
+          </a:ln>
+        </p:spPr>
+        <p:style>
+          <a:lnRef idx="0">
+            <a:scrgbClr r="0" g="0" b="0"/>
           </a:lnRef>
           <a:fillRef idx="0">
-            <a:schemeClr val="dk1"/>
-          </a:fillRef>
-          <a:effectRef idx="2">
-            <a:schemeClr val="dk1"/>
+            <a:scrgbClr r="0" g="0" b="0"/>
+          </a:fillRef>
+          <a:effectRef idx="0">
+            <a:scrgbClr r="0" g="0" b="0"/>
           </a:effectRef>
           <a:fontRef idx="minor">
             <a:schemeClr val="tx1"/>
@@ -4616,29 +4703,39 @@
             </a:extLst>
           </p:cNvPr>
           <p:cNvCxnSpPr>
-            <a:stCxn id="70" idx="1"/>
-            <a:endCxn id="72" idx="3"/>
+            <a:cxnSpLocks/>
+            <a:stCxn id="72" idx="3"/>
+            <a:endCxn id="70" idx="1"/>
           </p:cNvCxnSpPr>
           <p:nvPr/>
         </p:nvCxnSpPr>
         <p:spPr>
-          <a:xfrm flipH="1">
+          <a:xfrm>
             <a:off x="5047336" y="4169171"/>
             <a:ext cx="1894561" cy="0"/>
           </a:xfrm>
           <a:prstGeom prst="line">
             <a:avLst/>
           </a:prstGeom>
-        </p:spPr>
-        <p:style>
-          <a:lnRef idx="3">
-            <a:schemeClr val="dk1"/>
+          <a:ln w="9525" cap="flat" cmpd="sng" algn="ctr">
+            <a:solidFill>
+              <a:schemeClr val="dk1"/>
+            </a:solidFill>
+            <a:prstDash val="solid"/>
+            <a:round/>
+            <a:headEnd type="none" w="med" len="med"/>
+            <a:tailEnd type="arrow" w="med" len="med"/>
+          </a:ln>
+        </p:spPr>
+        <p:style>
+          <a:lnRef idx="0">
+            <a:scrgbClr r="0" g="0" b="0"/>
           </a:lnRef>
           <a:fillRef idx="0">
-            <a:schemeClr val="dk1"/>
-          </a:fillRef>
-          <a:effectRef idx="2">
-            <a:schemeClr val="dk1"/>
+            <a:scrgbClr r="0" g="0" b="0"/>
+          </a:fillRef>
+          <a:effectRef idx="0">
+            <a:scrgbClr r="0" g="0" b="0"/>
           </a:effectRef>
           <a:fontRef idx="minor">
             <a:schemeClr val="tx1"/>
@@ -4704,16 +4801,25 @@
           <a:prstGeom prst="line">
             <a:avLst/>
           </a:prstGeom>
-        </p:spPr>
-        <p:style>
-          <a:lnRef idx="3">
-            <a:schemeClr val="dk1"/>
+          <a:ln w="9525" cap="flat" cmpd="sng" algn="ctr">
+            <a:solidFill>
+              <a:schemeClr val="dk1"/>
+            </a:solidFill>
+            <a:prstDash val="solid"/>
+            <a:round/>
+            <a:headEnd type="none" w="med" len="med"/>
+            <a:tailEnd type="arrow" w="med" len="med"/>
+          </a:ln>
+        </p:spPr>
+        <p:style>
+          <a:lnRef idx="0">
+            <a:scrgbClr r="0" g="0" b="0"/>
           </a:lnRef>
           <a:fillRef idx="0">
-            <a:schemeClr val="dk1"/>
-          </a:fillRef>
-          <a:effectRef idx="2">
-            <a:schemeClr val="dk1"/>
+            <a:scrgbClr r="0" g="0" b="0"/>
+          </a:fillRef>
+          <a:effectRef idx="0">
+            <a:scrgbClr r="0" g="0" b="0"/>
           </a:effectRef>
           <a:fontRef idx="minor">
             <a:schemeClr val="tx1"/>
@@ -4744,16 +4850,25 @@
           <a:prstGeom prst="line">
             <a:avLst/>
           </a:prstGeom>
-        </p:spPr>
-        <p:style>
-          <a:lnRef idx="3">
-            <a:schemeClr val="dk1"/>
+          <a:ln w="9525" cap="flat" cmpd="sng" algn="ctr">
+            <a:solidFill>
+              <a:schemeClr val="dk1"/>
+            </a:solidFill>
+            <a:prstDash val="solid"/>
+            <a:round/>
+            <a:headEnd type="none" w="med" len="med"/>
+            <a:tailEnd type="arrow" w="med" len="med"/>
+          </a:ln>
+        </p:spPr>
+        <p:style>
+          <a:lnRef idx="0">
+            <a:scrgbClr r="0" g="0" b="0"/>
           </a:lnRef>
           <a:fillRef idx="0">
-            <a:schemeClr val="dk1"/>
-          </a:fillRef>
-          <a:effectRef idx="2">
-            <a:schemeClr val="dk1"/>
+            <a:scrgbClr r="0" g="0" b="0"/>
+          </a:fillRef>
+          <a:effectRef idx="0">
+            <a:scrgbClr r="0" g="0" b="0"/>
           </a:effectRef>
           <a:fontRef idx="minor">
             <a:schemeClr val="tx1"/>
@@ -4770,29 +4885,38 @@
             </a:extLst>
           </p:cNvPr>
           <p:cNvCxnSpPr>
+            <a:cxnSpLocks/>
             <a:stCxn id="71" idx="3"/>
-            <a:endCxn id="94" idx="1"/>
           </p:cNvCxnSpPr>
           <p:nvPr/>
         </p:nvCxnSpPr>
         <p:spPr>
           <a:xfrm>
             <a:off x="7422644" y="2106624"/>
-            <a:ext cx="2100108" cy="1164574"/>
+            <a:ext cx="2100108" cy="1041684"/>
           </a:xfrm>
           <a:prstGeom prst="line">
             <a:avLst/>
           </a:prstGeom>
-        </p:spPr>
-        <p:style>
-          <a:lnRef idx="3">
-            <a:schemeClr val="dk1"/>
+          <a:ln w="9525" cap="flat" cmpd="sng" algn="ctr">
+            <a:solidFill>
+              <a:schemeClr val="dk1"/>
+            </a:solidFill>
+            <a:prstDash val="solid"/>
+            <a:round/>
+            <a:headEnd type="none" w="med" len="med"/>
+            <a:tailEnd type="arrow" w="med" len="med"/>
+          </a:ln>
+        </p:spPr>
+        <p:style>
+          <a:lnRef idx="0">
+            <a:scrgbClr r="0" g="0" b="0"/>
           </a:lnRef>
           <a:fillRef idx="0">
-            <a:schemeClr val="dk1"/>
-          </a:fillRef>
-          <a:effectRef idx="2">
-            <a:schemeClr val="dk1"/>
+            <a:scrgbClr r="0" g="0" b="0"/>
+          </a:fillRef>
+          <a:effectRef idx="0">
+            <a:scrgbClr r="0" g="0" b="0"/>
           </a:effectRef>
           <a:fontRef idx="minor">
             <a:schemeClr val="tx1"/>
@@ -4809,29 +4933,38 @@
             </a:extLst>
           </p:cNvPr>
           <p:cNvCxnSpPr>
+            <a:cxnSpLocks/>
             <a:stCxn id="70" idx="3"/>
-            <a:endCxn id="94" idx="1"/>
           </p:cNvCxnSpPr>
           <p:nvPr/>
         </p:nvCxnSpPr>
         <p:spPr>
           <a:xfrm flipV="1">
-            <a:off x="7422644" y="3271198"/>
-            <a:ext cx="2100108" cy="897973"/>
+            <a:off x="7422644" y="3391971"/>
+            <a:ext cx="2100108" cy="777200"/>
           </a:xfrm>
           <a:prstGeom prst="line">
             <a:avLst/>
           </a:prstGeom>
-        </p:spPr>
-        <p:style>
-          <a:lnRef idx="3">
-            <a:schemeClr val="dk1"/>
+          <a:ln w="9525" cap="flat" cmpd="sng" algn="ctr">
+            <a:solidFill>
+              <a:schemeClr val="dk1"/>
+            </a:solidFill>
+            <a:prstDash val="solid"/>
+            <a:round/>
+            <a:headEnd type="none" w="med" len="med"/>
+            <a:tailEnd type="arrow" w="med" len="med"/>
+          </a:ln>
+        </p:spPr>
+        <p:style>
+          <a:lnRef idx="0">
+            <a:scrgbClr r="0" g="0" b="0"/>
           </a:lnRef>
           <a:fillRef idx="0">
-            <a:schemeClr val="dk1"/>
-          </a:fillRef>
-          <a:effectRef idx="2">
-            <a:schemeClr val="dk1"/>
+            <a:scrgbClr r="0" g="0" b="0"/>
+          </a:fillRef>
+          <a:effectRef idx="0">
+            <a:scrgbClr r="0" g="0" b="0"/>
           </a:effectRef>
           <a:fontRef idx="minor">
             <a:schemeClr val="tx1"/>
@@ -4849,29 +4982,36 @@
           </p:cNvPr>
           <p:cNvCxnSpPr>
             <a:cxnSpLocks/>
-            <a:stCxn id="73" idx="2"/>
-            <a:endCxn id="70" idx="1"/>
           </p:cNvCxnSpPr>
           <p:nvPr/>
         </p:nvCxnSpPr>
         <p:spPr>
           <a:xfrm>
-            <a:off x="4806963" y="2264426"/>
-            <a:ext cx="2134934" cy="1904745"/>
+            <a:off x="5047336" y="2264426"/>
+            <a:ext cx="1894561" cy="1763948"/>
           </a:xfrm>
           <a:prstGeom prst="line">
             <a:avLst/>
           </a:prstGeom>
-        </p:spPr>
-        <p:style>
-          <a:lnRef idx="3">
-            <a:schemeClr val="dk1"/>
+          <a:ln w="9525" cap="flat" cmpd="sng" algn="ctr">
+            <a:solidFill>
+              <a:schemeClr val="dk1"/>
+            </a:solidFill>
+            <a:prstDash val="solid"/>
+            <a:round/>
+            <a:headEnd type="none" w="med" len="med"/>
+            <a:tailEnd type="arrow" w="med" len="med"/>
+          </a:ln>
+        </p:spPr>
+        <p:style>
+          <a:lnRef idx="0">
+            <a:scrgbClr r="0" g="0" b="0"/>
           </a:lnRef>
           <a:fillRef idx="0">
-            <a:schemeClr val="dk1"/>
-          </a:fillRef>
-          <a:effectRef idx="2">
-            <a:schemeClr val="dk1"/>
+            <a:scrgbClr r="0" g="0" b="0"/>
+          </a:fillRef>
+          <a:effectRef idx="0">
+            <a:scrgbClr r="0" g="0" b="0"/>
           </a:effectRef>
           <a:fontRef idx="minor">
             <a:schemeClr val="tx1"/>
@@ -5672,7 +5812,7 @@
         </p:nvSpPr>
         <p:spPr>
           <a:xfrm>
-            <a:off x="5887734" y="3053417"/>
+            <a:off x="5991678" y="2976361"/>
             <a:ext cx="321839" cy="338554"/>
           </a:xfrm>
           <a:prstGeom prst="rect">
@@ -26952,13 +27092,13 @@
   <p:clrMapOvr>
     <a:masterClrMapping/>
   </p:clrMapOvr>
-  <mc:AlternateContent xmlns:mc="http://schemas.openxmlformats.org/markup-compatibility/2006">
-    <mc:Choice xmlns:p159="http://schemas.microsoft.com/office/powerpoint/2015/09/main" Requires="p159">
+  <mc:AlternateContent xmlns:mc="http://schemas.openxmlformats.org/markup-compatibility/2006" xmlns:p159="http://schemas.microsoft.com/office/powerpoint/2015/09/main">
+    <mc:Choice Requires="p159">
       <p:transition xmlns:p14="http://schemas.microsoft.com/office/powerpoint/2010/main" spd="slow" p14:dur="2000">
         <p159:morph option="byObject"/>
       </p:transition>
     </mc:Choice>
-    <mc:Fallback>
+    <mc:Fallback xmlns="">
       <p:transition spd="slow">
         <p:fade/>
       </p:transition>
@@ -27123,28 +27263,37 @@
           <p:cNvCxnSpPr>
             <a:cxnSpLocks/>
             <a:stCxn id="109" idx="6"/>
-            <a:endCxn id="101" idx="2"/>
+            <a:endCxn id="101" idx="1"/>
           </p:cNvCxnSpPr>
           <p:nvPr/>
         </p:nvCxnSpPr>
         <p:spPr>
           <a:xfrm>
             <a:off x="1191590" y="1717832"/>
-            <a:ext cx="1039520" cy="1352707"/>
+            <a:ext cx="1175297" cy="1198314"/>
           </a:xfrm>
           <a:prstGeom prst="line">
             <a:avLst/>
           </a:prstGeom>
-        </p:spPr>
-        <p:style>
-          <a:lnRef idx="3">
-            <a:schemeClr val="dk1"/>
+          <a:ln w="9525" cap="flat" cmpd="sng" algn="ctr">
+            <a:solidFill>
+              <a:schemeClr val="dk1"/>
+            </a:solidFill>
+            <a:prstDash val="solid"/>
+            <a:round/>
+            <a:headEnd type="none" w="med" len="med"/>
+            <a:tailEnd type="arrow" w="med" len="med"/>
+          </a:ln>
+        </p:spPr>
+        <p:style>
+          <a:lnRef idx="0">
+            <a:scrgbClr r="0" g="0" b="0"/>
           </a:lnRef>
           <a:fillRef idx="0">
-            <a:schemeClr val="dk1"/>
-          </a:fillRef>
-          <a:effectRef idx="2">
-            <a:schemeClr val="dk1"/>
+            <a:scrgbClr r="0" g="0" b="0"/>
+          </a:fillRef>
+          <a:effectRef idx="0">
+            <a:scrgbClr r="0" g="0" b="0"/>
           </a:effectRef>
           <a:fontRef idx="minor">
             <a:schemeClr val="tx1"/>
@@ -27175,16 +27324,25 @@
           <a:prstGeom prst="line">
             <a:avLst/>
           </a:prstGeom>
-        </p:spPr>
-        <p:style>
-          <a:lnRef idx="3">
-            <a:schemeClr val="dk1"/>
+          <a:ln w="9525" cap="flat" cmpd="sng" algn="ctr">
+            <a:solidFill>
+              <a:schemeClr val="dk1"/>
+            </a:solidFill>
+            <a:prstDash val="solid"/>
+            <a:round/>
+            <a:headEnd type="none" w="med" len="med"/>
+            <a:tailEnd type="arrow" w="med" len="med"/>
+          </a:ln>
+        </p:spPr>
+        <p:style>
+          <a:lnRef idx="0">
+            <a:scrgbClr r="0" g="0" b="0"/>
           </a:lnRef>
           <a:fillRef idx="0">
-            <a:schemeClr val="dk1"/>
-          </a:fillRef>
-          <a:effectRef idx="2">
-            <a:schemeClr val="dk1"/>
+            <a:scrgbClr r="0" g="0" b="0"/>
+          </a:fillRef>
+          <a:effectRef idx="0">
+            <a:scrgbClr r="0" g="0" b="0"/>
           </a:effectRef>
           <a:fontRef idx="minor">
             <a:schemeClr val="tx1"/>
@@ -27215,16 +27373,25 @@
           <a:prstGeom prst="line">
             <a:avLst/>
           </a:prstGeom>
-        </p:spPr>
-        <p:style>
-          <a:lnRef idx="3">
-            <a:schemeClr val="dk1"/>
+          <a:ln w="9525" cap="flat" cmpd="sng" algn="ctr">
+            <a:solidFill>
+              <a:schemeClr val="dk1"/>
+            </a:solidFill>
+            <a:prstDash val="solid"/>
+            <a:round/>
+            <a:headEnd type="none" w="med" len="med"/>
+            <a:tailEnd type="arrow" w="med" len="med"/>
+          </a:ln>
+        </p:spPr>
+        <p:style>
+          <a:lnRef idx="0">
+            <a:scrgbClr r="0" g="0" b="0"/>
           </a:lnRef>
           <a:fillRef idx="0">
-            <a:schemeClr val="dk1"/>
-          </a:fillRef>
-          <a:effectRef idx="2">
-            <a:schemeClr val="dk1"/>
+            <a:scrgbClr r="0" g="0" b="0"/>
+          </a:fillRef>
+          <a:effectRef idx="0">
+            <a:scrgbClr r="0" g="0" b="0"/>
           </a:effectRef>
           <a:fontRef idx="minor">
             <a:schemeClr val="tx1"/>
@@ -27243,28 +27410,37 @@
           <p:cNvCxnSpPr>
             <a:cxnSpLocks/>
             <a:stCxn id="112" idx="6"/>
-            <a:endCxn id="101" idx="2"/>
+            <a:endCxn id="101" idx="3"/>
           </p:cNvCxnSpPr>
           <p:nvPr/>
         </p:nvCxnSpPr>
         <p:spPr>
           <a:xfrm flipV="1">
-            <a:off x="1191590" y="3070539"/>
-            <a:ext cx="1039520" cy="2380052"/>
+            <a:off x="1191590" y="3224932"/>
+            <a:ext cx="1175297" cy="2225659"/>
           </a:xfrm>
           <a:prstGeom prst="line">
             <a:avLst/>
           </a:prstGeom>
-        </p:spPr>
-        <p:style>
-          <a:lnRef idx="3">
-            <a:schemeClr val="dk1"/>
+          <a:ln w="9525" cap="flat" cmpd="sng" algn="ctr">
+            <a:solidFill>
+              <a:schemeClr val="dk1"/>
+            </a:solidFill>
+            <a:prstDash val="solid"/>
+            <a:round/>
+            <a:headEnd type="none" w="med" len="med"/>
+            <a:tailEnd type="arrow" w="med" len="med"/>
+          </a:ln>
+        </p:spPr>
+        <p:style>
+          <a:lnRef idx="0">
+            <a:scrgbClr r="0" g="0" b="0"/>
           </a:lnRef>
           <a:fillRef idx="0">
-            <a:schemeClr val="dk1"/>
-          </a:fillRef>
-          <a:effectRef idx="2">
-            <a:schemeClr val="dk1"/>
+            <a:scrgbClr r="0" g="0" b="0"/>
+          </a:fillRef>
+          <a:effectRef idx="0">
+            <a:scrgbClr r="0" g="0" b="0"/>
           </a:effectRef>
           <a:fontRef idx="minor">
             <a:schemeClr val="tx1"/>
@@ -27282,29 +27458,38 @@
           </p:cNvPr>
           <p:cNvCxnSpPr>
             <a:cxnSpLocks/>
-            <a:stCxn id="6" idx="2"/>
-            <a:endCxn id="83" idx="6"/>
+            <a:stCxn id="83" idx="6"/>
+            <a:endCxn id="6" idx="2"/>
           </p:cNvCxnSpPr>
           <p:nvPr/>
         </p:nvCxnSpPr>
         <p:spPr>
-          <a:xfrm flipH="1">
+          <a:xfrm flipV="1">
             <a:off x="10161300" y="1752373"/>
             <a:ext cx="958570" cy="1474820"/>
           </a:xfrm>
           <a:prstGeom prst="line">
             <a:avLst/>
           </a:prstGeom>
-        </p:spPr>
-        <p:style>
-          <a:lnRef idx="3">
-            <a:schemeClr val="dk1"/>
+          <a:ln w="9525" cap="flat" cmpd="sng" algn="ctr">
+            <a:solidFill>
+              <a:schemeClr val="dk1"/>
+            </a:solidFill>
+            <a:prstDash val="solid"/>
+            <a:round/>
+            <a:headEnd type="none" w="med" len="med"/>
+            <a:tailEnd type="arrow" w="med" len="med"/>
+          </a:ln>
+        </p:spPr>
+        <p:style>
+          <a:lnRef idx="0">
+            <a:scrgbClr r="0" g="0" b="0"/>
           </a:lnRef>
           <a:fillRef idx="0">
-            <a:schemeClr val="dk1"/>
-          </a:fillRef>
-          <a:effectRef idx="2">
-            <a:schemeClr val="dk1"/>
+            <a:scrgbClr r="0" g="0" b="0"/>
+          </a:fillRef>
+          <a:effectRef idx="0">
+            <a:scrgbClr r="0" g="0" b="0"/>
           </a:effectRef>
           <a:fontRef idx="minor">
             <a:schemeClr val="tx1"/>
@@ -27322,29 +27507,38 @@
           </p:cNvPr>
           <p:cNvCxnSpPr>
             <a:cxnSpLocks/>
-            <a:stCxn id="79" idx="2"/>
-            <a:endCxn id="83" idx="6"/>
+            <a:stCxn id="83" idx="6"/>
+            <a:endCxn id="79" idx="2"/>
           </p:cNvCxnSpPr>
           <p:nvPr/>
         </p:nvCxnSpPr>
         <p:spPr>
-          <a:xfrm flipH="1">
+          <a:xfrm flipV="1">
             <a:off x="10161300" y="2959425"/>
             <a:ext cx="958570" cy="267768"/>
           </a:xfrm>
           <a:prstGeom prst="line">
             <a:avLst/>
           </a:prstGeom>
-        </p:spPr>
-        <p:style>
-          <a:lnRef idx="3">
-            <a:schemeClr val="dk1"/>
+          <a:ln w="9525" cap="flat" cmpd="sng" algn="ctr">
+            <a:solidFill>
+              <a:schemeClr val="dk1"/>
+            </a:solidFill>
+            <a:prstDash val="solid"/>
+            <a:round/>
+            <a:headEnd type="none" w="med" len="med"/>
+            <a:tailEnd type="arrow" w="med" len="med"/>
+          </a:ln>
+        </p:spPr>
+        <p:style>
+          <a:lnRef idx="0">
+            <a:scrgbClr r="0" g="0" b="0"/>
           </a:lnRef>
           <a:fillRef idx="0">
-            <a:schemeClr val="dk1"/>
-          </a:fillRef>
-          <a:effectRef idx="2">
-            <a:schemeClr val="dk1"/>
+            <a:scrgbClr r="0" g="0" b="0"/>
+          </a:fillRef>
+          <a:effectRef idx="0">
+            <a:scrgbClr r="0" g="0" b="0"/>
           </a:effectRef>
           <a:fontRef idx="minor">
             <a:schemeClr val="tx1"/>
@@ -27362,29 +27556,38 @@
           </p:cNvPr>
           <p:cNvCxnSpPr>
             <a:cxnSpLocks/>
-            <a:stCxn id="78" idx="2"/>
-            <a:endCxn id="83" idx="6"/>
+            <a:stCxn id="83" idx="6"/>
+            <a:endCxn id="78" idx="2"/>
           </p:cNvCxnSpPr>
           <p:nvPr/>
         </p:nvCxnSpPr>
         <p:spPr>
-          <a:xfrm flipH="1" flipV="1">
+          <a:xfrm>
             <a:off x="10161300" y="3227193"/>
             <a:ext cx="958570" cy="886173"/>
           </a:xfrm>
           <a:prstGeom prst="line">
             <a:avLst/>
           </a:prstGeom>
-        </p:spPr>
-        <p:style>
-          <a:lnRef idx="3">
-            <a:schemeClr val="dk1"/>
+          <a:ln w="9525" cap="flat" cmpd="sng" algn="ctr">
+            <a:solidFill>
+              <a:schemeClr val="dk1"/>
+            </a:solidFill>
+            <a:prstDash val="solid"/>
+            <a:round/>
+            <a:headEnd type="none" w="med" len="med"/>
+            <a:tailEnd type="arrow" w="med" len="med"/>
+          </a:ln>
+        </p:spPr>
+        <p:style>
+          <a:lnRef idx="0">
+            <a:scrgbClr r="0" g="0" b="0"/>
           </a:lnRef>
           <a:fillRef idx="0">
-            <a:schemeClr val="dk1"/>
-          </a:fillRef>
-          <a:effectRef idx="2">
-            <a:schemeClr val="dk1"/>
+            <a:scrgbClr r="0" g="0" b="0"/>
+          </a:fillRef>
+          <a:effectRef idx="0">
+            <a:scrgbClr r="0" g="0" b="0"/>
           </a:effectRef>
           <a:fontRef idx="minor">
             <a:schemeClr val="tx1"/>
@@ -27402,29 +27605,38 @@
           </p:cNvPr>
           <p:cNvCxnSpPr>
             <a:cxnSpLocks/>
-            <a:stCxn id="82" idx="2"/>
-            <a:endCxn id="83" idx="6"/>
+            <a:stCxn id="83" idx="6"/>
+            <a:endCxn id="82" idx="1"/>
           </p:cNvCxnSpPr>
           <p:nvPr/>
         </p:nvCxnSpPr>
         <p:spPr>
-          <a:xfrm flipH="1" flipV="1">
+          <a:xfrm>
             <a:off x="10161300" y="3227193"/>
-            <a:ext cx="958570" cy="2148092"/>
+            <a:ext cx="1093261" cy="1957415"/>
           </a:xfrm>
           <a:prstGeom prst="line">
             <a:avLst/>
           </a:prstGeom>
-        </p:spPr>
-        <p:style>
-          <a:lnRef idx="3">
-            <a:schemeClr val="dk1"/>
+          <a:ln w="9525" cap="flat" cmpd="sng" algn="ctr">
+            <a:solidFill>
+              <a:schemeClr val="dk1"/>
+            </a:solidFill>
+            <a:prstDash val="solid"/>
+            <a:round/>
+            <a:headEnd type="none" w="med" len="med"/>
+            <a:tailEnd type="arrow" w="med" len="med"/>
+          </a:ln>
+        </p:spPr>
+        <p:style>
+          <a:lnRef idx="0">
+            <a:scrgbClr r="0" g="0" b="0"/>
           </a:lnRef>
           <a:fillRef idx="0">
-            <a:schemeClr val="dk1"/>
-          </a:fillRef>
-          <a:effectRef idx="2">
-            <a:schemeClr val="dk1"/>
+            <a:scrgbClr r="0" g="0" b="0"/>
+          </a:fillRef>
+          <a:effectRef idx="0">
+            <a:scrgbClr r="0" g="0" b="0"/>
           </a:effectRef>
           <a:fontRef idx="minor">
             <a:schemeClr val="tx1"/>
@@ -27455,16 +27667,25 @@
           <a:prstGeom prst="line">
             <a:avLst/>
           </a:prstGeom>
-        </p:spPr>
-        <p:style>
-          <a:lnRef idx="3">
-            <a:schemeClr val="dk1"/>
+          <a:ln w="9525" cap="flat" cmpd="sng" algn="ctr">
+            <a:solidFill>
+              <a:schemeClr val="dk1"/>
+            </a:solidFill>
+            <a:prstDash val="solid"/>
+            <a:round/>
+            <a:headEnd type="none" w="med" len="med"/>
+            <a:tailEnd type="arrow" w="med" len="med"/>
+          </a:ln>
+        </p:spPr>
+        <p:style>
+          <a:lnRef idx="0">
+            <a:scrgbClr r="0" g="0" b="0"/>
           </a:lnRef>
           <a:fillRef idx="0">
-            <a:schemeClr val="dk1"/>
-          </a:fillRef>
-          <a:effectRef idx="2">
-            <a:schemeClr val="dk1"/>
+            <a:scrgbClr r="0" g="0" b="0"/>
+          </a:fillRef>
+          <a:effectRef idx="0">
+            <a:scrgbClr r="0" g="0" b="0"/>
           </a:effectRef>
           <a:fontRef idx="minor">
             <a:schemeClr val="tx1"/>
@@ -27495,16 +27716,25 @@
           <a:prstGeom prst="line">
             <a:avLst/>
           </a:prstGeom>
-        </p:spPr>
-        <p:style>
-          <a:lnRef idx="3">
-            <a:schemeClr val="dk1"/>
+          <a:ln w="9525" cap="flat" cmpd="sng" algn="ctr">
+            <a:solidFill>
+              <a:schemeClr val="dk1"/>
+            </a:solidFill>
+            <a:prstDash val="solid"/>
+            <a:round/>
+            <a:headEnd type="arrow" w="med" len="med"/>
+            <a:tailEnd type="arrow" w="med" len="med"/>
+          </a:ln>
+        </p:spPr>
+        <p:style>
+          <a:lnRef idx="0">
+            <a:scrgbClr r="0" g="0" b="0"/>
           </a:lnRef>
           <a:fillRef idx="0">
-            <a:schemeClr val="dk1"/>
-          </a:fillRef>
-          <a:effectRef idx="2">
-            <a:schemeClr val="dk1"/>
+            <a:scrgbClr r="0" g="0" b="0"/>
+          </a:fillRef>
+          <a:effectRef idx="0">
+            <a:scrgbClr r="0" g="0" b="0"/>
           </a:effectRef>
           <a:fontRef idx="minor">
             <a:schemeClr val="tx1"/>
@@ -27522,29 +27752,38 @@
           </p:cNvPr>
           <p:cNvCxnSpPr>
             <a:cxnSpLocks/>
-            <a:stCxn id="99" idx="2"/>
-            <a:endCxn id="89" idx="6"/>
+            <a:stCxn id="89" idx="6"/>
+            <a:endCxn id="99" idx="2"/>
           </p:cNvCxnSpPr>
           <p:nvPr/>
         </p:nvCxnSpPr>
         <p:spPr>
-          <a:xfrm flipH="1">
+          <a:xfrm flipV="1">
             <a:off x="5179463" y="4091327"/>
             <a:ext cx="1671236" cy="42878"/>
           </a:xfrm>
           <a:prstGeom prst="line">
             <a:avLst/>
           </a:prstGeom>
-        </p:spPr>
-        <p:style>
-          <a:lnRef idx="3">
-            <a:schemeClr val="dk1"/>
+          <a:ln w="9525" cap="flat" cmpd="sng" algn="ctr">
+            <a:solidFill>
+              <a:schemeClr val="dk1"/>
+            </a:solidFill>
+            <a:prstDash val="solid"/>
+            <a:round/>
+            <a:headEnd type="none" w="med" len="med"/>
+            <a:tailEnd type="arrow" w="med" len="med"/>
+          </a:ln>
+        </p:spPr>
+        <p:style>
+          <a:lnRef idx="0">
+            <a:scrgbClr r="0" g="0" b="0"/>
           </a:lnRef>
           <a:fillRef idx="0">
-            <a:schemeClr val="dk1"/>
-          </a:fillRef>
-          <a:effectRef idx="2">
-            <a:schemeClr val="dk1"/>
+            <a:scrgbClr r="0" g="0" b="0"/>
+          </a:fillRef>
+          <a:effectRef idx="0">
+            <a:scrgbClr r="0" g="0" b="0"/>
           </a:effectRef>
           <a:fontRef idx="minor">
             <a:schemeClr val="tx1"/>
@@ -27611,16 +27850,25 @@
           <a:prstGeom prst="line">
             <a:avLst/>
           </a:prstGeom>
-        </p:spPr>
-        <p:style>
-          <a:lnRef idx="3">
-            <a:schemeClr val="dk1"/>
+          <a:ln w="9525" cap="flat" cmpd="sng" algn="ctr">
+            <a:solidFill>
+              <a:schemeClr val="dk1"/>
+            </a:solidFill>
+            <a:prstDash val="solid"/>
+            <a:round/>
+            <a:headEnd type="none" w="med" len="med"/>
+            <a:tailEnd type="arrow" w="med" len="med"/>
+          </a:ln>
+        </p:spPr>
+        <p:style>
+          <a:lnRef idx="0">
+            <a:scrgbClr r="0" g="0" b="0"/>
           </a:lnRef>
           <a:fillRef idx="0">
-            <a:schemeClr val="dk1"/>
-          </a:fillRef>
-          <a:effectRef idx="2">
-            <a:schemeClr val="dk1"/>
+            <a:scrgbClr r="0" g="0" b="0"/>
+          </a:fillRef>
+          <a:effectRef idx="0">
+            <a:scrgbClr r="0" g="0" b="0"/>
           </a:effectRef>
           <a:fontRef idx="minor">
             <a:schemeClr val="tx1"/>
@@ -27651,16 +27899,25 @@
           <a:prstGeom prst="line">
             <a:avLst/>
           </a:prstGeom>
-        </p:spPr>
-        <p:style>
-          <a:lnRef idx="3">
-            <a:schemeClr val="dk1"/>
+          <a:ln w="9525" cap="flat" cmpd="sng" algn="ctr">
+            <a:solidFill>
+              <a:schemeClr val="dk1"/>
+            </a:solidFill>
+            <a:prstDash val="solid"/>
+            <a:round/>
+            <a:headEnd type="none" w="med" len="med"/>
+            <a:tailEnd type="arrow" w="med" len="med"/>
+          </a:ln>
+        </p:spPr>
+        <p:style>
+          <a:lnRef idx="0">
+            <a:scrgbClr r="0" g="0" b="0"/>
           </a:lnRef>
           <a:fillRef idx="0">
-            <a:schemeClr val="dk1"/>
-          </a:fillRef>
-          <a:effectRef idx="2">
-            <a:schemeClr val="dk1"/>
+            <a:scrgbClr r="0" g="0" b="0"/>
+          </a:fillRef>
+          <a:effectRef idx="0">
+            <a:scrgbClr r="0" g="0" b="0"/>
           </a:effectRef>
           <a:fontRef idx="minor">
             <a:schemeClr val="tx1"/>
@@ -27679,28 +27936,37 @@
           <p:cNvCxnSpPr>
             <a:cxnSpLocks/>
             <a:stCxn id="97" idx="6"/>
-            <a:endCxn id="83" idx="2"/>
+            <a:endCxn id="83" idx="1"/>
           </p:cNvCxnSpPr>
           <p:nvPr/>
         </p:nvCxnSpPr>
         <p:spPr>
           <a:xfrm>
             <a:off x="7609620" y="2118976"/>
-            <a:ext cx="1789010" cy="1108217"/>
+            <a:ext cx="1900700" cy="966391"/>
           </a:xfrm>
           <a:prstGeom prst="line">
             <a:avLst/>
           </a:prstGeom>
-        </p:spPr>
-        <p:style>
-          <a:lnRef idx="3">
-            <a:schemeClr val="dk1"/>
+          <a:ln w="9525" cap="flat" cmpd="sng" algn="ctr">
+            <a:solidFill>
+              <a:schemeClr val="dk1"/>
+            </a:solidFill>
+            <a:prstDash val="solid"/>
+            <a:round/>
+            <a:headEnd type="none" w="med" len="med"/>
+            <a:tailEnd type="arrow" w="med" len="med"/>
+          </a:ln>
+        </p:spPr>
+        <p:style>
+          <a:lnRef idx="0">
+            <a:scrgbClr r="0" g="0" b="0"/>
           </a:lnRef>
           <a:fillRef idx="0">
-            <a:schemeClr val="dk1"/>
-          </a:fillRef>
-          <a:effectRef idx="2">
-            <a:schemeClr val="dk1"/>
+            <a:scrgbClr r="0" g="0" b="0"/>
+          </a:fillRef>
+          <a:effectRef idx="0">
+            <a:scrgbClr r="0" g="0" b="0"/>
           </a:effectRef>
           <a:fontRef idx="minor">
             <a:schemeClr val="tx1"/>
@@ -27719,28 +27985,37 @@
           <p:cNvCxnSpPr>
             <a:cxnSpLocks/>
             <a:stCxn id="99" idx="6"/>
-            <a:endCxn id="83" idx="2"/>
+            <a:endCxn id="83" idx="3"/>
           </p:cNvCxnSpPr>
           <p:nvPr/>
         </p:nvCxnSpPr>
         <p:spPr>
           <a:xfrm flipV="1">
-            <a:off x="7613369" y="3227193"/>
-            <a:ext cx="1785261" cy="864134"/>
+            <a:off x="7613369" y="3369019"/>
+            <a:ext cx="1896951" cy="722308"/>
           </a:xfrm>
           <a:prstGeom prst="line">
             <a:avLst/>
           </a:prstGeom>
-        </p:spPr>
-        <p:style>
-          <a:lnRef idx="3">
-            <a:schemeClr val="dk1"/>
+          <a:ln w="9525" cap="flat" cmpd="sng" algn="ctr">
+            <a:solidFill>
+              <a:schemeClr val="dk1"/>
+            </a:solidFill>
+            <a:prstDash val="solid"/>
+            <a:round/>
+            <a:headEnd type="none" w="med" len="med"/>
+            <a:tailEnd type="arrow" w="med" len="med"/>
+          </a:ln>
+        </p:spPr>
+        <p:style>
+          <a:lnRef idx="0">
+            <a:scrgbClr r="0" g="0" b="0"/>
           </a:lnRef>
           <a:fillRef idx="0">
-            <a:schemeClr val="dk1"/>
-          </a:fillRef>
-          <a:effectRef idx="2">
-            <a:schemeClr val="dk1"/>
+            <a:scrgbClr r="0" g="0" b="0"/>
+          </a:fillRef>
+          <a:effectRef idx="0">
+            <a:scrgbClr r="0" g="0" b="0"/>
           </a:effectRef>
           <a:fontRef idx="minor">
             <a:schemeClr val="tx1"/>
@@ -27758,29 +28033,38 @@
           </p:cNvPr>
           <p:cNvCxnSpPr>
             <a:cxnSpLocks/>
-            <a:stCxn id="88" idx="4"/>
-            <a:endCxn id="99" idx="2"/>
+            <a:stCxn id="88" idx="5"/>
+            <a:endCxn id="99" idx="1"/>
           </p:cNvCxnSpPr>
           <p:nvPr/>
         </p:nvCxnSpPr>
         <p:spPr>
           <a:xfrm>
-            <a:off x="4783085" y="2389811"/>
-            <a:ext cx="2067614" cy="1701516"/>
+            <a:off x="5086462" y="2325255"/>
+            <a:ext cx="1875927" cy="1624246"/>
           </a:xfrm>
           <a:prstGeom prst="line">
             <a:avLst/>
           </a:prstGeom>
-        </p:spPr>
-        <p:style>
-          <a:lnRef idx="3">
-            <a:schemeClr val="dk1"/>
+          <a:ln w="9525" cap="flat" cmpd="sng" algn="ctr">
+            <a:solidFill>
+              <a:schemeClr val="dk1"/>
+            </a:solidFill>
+            <a:prstDash val="solid"/>
+            <a:round/>
+            <a:headEnd type="none" w="med" len="med"/>
+            <a:tailEnd type="arrow" w="med" len="med"/>
+          </a:ln>
+        </p:spPr>
+        <p:style>
+          <a:lnRef idx="0">
+            <a:scrgbClr r="0" g="0" b="0"/>
           </a:lnRef>
           <a:fillRef idx="0">
-            <a:schemeClr val="dk1"/>
-          </a:fillRef>
-          <a:effectRef idx="2">
-            <a:schemeClr val="dk1"/>
+            <a:scrgbClr r="0" g="0" b="0"/>
+          </a:fillRef>
+          <a:effectRef idx="0">
+            <a:scrgbClr r="0" g="0" b="0"/>
           </a:effectRef>
           <a:fontRef idx="minor">
             <a:schemeClr val="tx1"/>
@@ -28065,7 +28349,7 @@
         </p:nvSpPr>
         <p:spPr>
           <a:xfrm>
-            <a:off x="5887734" y="3053417"/>
+            <a:off x="6055645" y="2961503"/>
             <a:ext cx="321839" cy="338554"/>
           </a:xfrm>
           <a:prstGeom prst="rect">
@@ -28385,7 +28669,7 @@
         </p:nvSpPr>
         <p:spPr>
           <a:xfrm>
-            <a:off x="10627276" y="4178600"/>
+            <a:off x="10685681" y="4062876"/>
             <a:ext cx="321839" cy="338554"/>
           </a:xfrm>
           <a:prstGeom prst="rect">

</xml_diff>